<commit_message>
Removed unnecessary images. Add final notebook.
</commit_message>
<xml_diff>
--- a/data/image/image development.pptx
+++ b/data/image/image development.pptx
@@ -7,7 +7,6 @@
   <p:sldIdLst>
     <p:sldId id="256" r:id="rId2"/>
     <p:sldId id="257" r:id="rId3"/>
-    <p:sldId id="258" r:id="rId4"/>
   </p:sldIdLst>
   <p:sldSz cx="12192000" cy="6858000"/>
   <p:notesSz cx="6858000" cy="9144000"/>
@@ -106,6 +105,11 @@
       </a:defRPr>
     </a:lvl9pPr>
   </p:defaultTextStyle>
+  <p:extLst>
+    <p:ext uri="{EFAFB233-063F-42B5-8137-9DF3F51BA10A}">
+      <p15:sldGuideLst xmlns:p15="http://schemas.microsoft.com/office/powerpoint/2012/main"/>
+    </p:ext>
+  </p:extLst>
 </p:presentation>
 </file>
 
@@ -256,7 +260,7 @@
           <a:p>
             <a:fld id="{DEB065CA-2BF4-44D6-BE19-9CF89952384D}" type="datetimeFigureOut">
               <a:rPr lang="en-US" smtClean="0"/>
-              <a:t>5/15/2022</a:t>
+              <a:t>5/18/2022</a:t>
             </a:fld>
             <a:endParaRPr lang="en-US"/>
           </a:p>
@@ -454,7 +458,7 @@
           <a:p>
             <a:fld id="{DEB065CA-2BF4-44D6-BE19-9CF89952384D}" type="datetimeFigureOut">
               <a:rPr lang="en-US" smtClean="0"/>
-              <a:t>5/15/2022</a:t>
+              <a:t>5/18/2022</a:t>
             </a:fld>
             <a:endParaRPr lang="en-US"/>
           </a:p>
@@ -662,7 +666,7 @@
           <a:p>
             <a:fld id="{DEB065CA-2BF4-44D6-BE19-9CF89952384D}" type="datetimeFigureOut">
               <a:rPr lang="en-US" smtClean="0"/>
-              <a:t>5/15/2022</a:t>
+              <a:t>5/18/2022</a:t>
             </a:fld>
             <a:endParaRPr lang="en-US"/>
           </a:p>
@@ -860,7 +864,7 @@
           <a:p>
             <a:fld id="{DEB065CA-2BF4-44D6-BE19-9CF89952384D}" type="datetimeFigureOut">
               <a:rPr lang="en-US" smtClean="0"/>
-              <a:t>5/15/2022</a:t>
+              <a:t>5/18/2022</a:t>
             </a:fld>
             <a:endParaRPr lang="en-US"/>
           </a:p>
@@ -1135,7 +1139,7 @@
           <a:p>
             <a:fld id="{DEB065CA-2BF4-44D6-BE19-9CF89952384D}" type="datetimeFigureOut">
               <a:rPr lang="en-US" smtClean="0"/>
-              <a:t>5/15/2022</a:t>
+              <a:t>5/18/2022</a:t>
             </a:fld>
             <a:endParaRPr lang="en-US"/>
           </a:p>
@@ -1400,7 +1404,7 @@
           <a:p>
             <a:fld id="{DEB065CA-2BF4-44D6-BE19-9CF89952384D}" type="datetimeFigureOut">
               <a:rPr lang="en-US" smtClean="0"/>
-              <a:t>5/15/2022</a:t>
+              <a:t>5/18/2022</a:t>
             </a:fld>
             <a:endParaRPr lang="en-US"/>
           </a:p>
@@ -1812,7 +1816,7 @@
           <a:p>
             <a:fld id="{DEB065CA-2BF4-44D6-BE19-9CF89952384D}" type="datetimeFigureOut">
               <a:rPr lang="en-US" smtClean="0"/>
-              <a:t>5/15/2022</a:t>
+              <a:t>5/18/2022</a:t>
             </a:fld>
             <a:endParaRPr lang="en-US"/>
           </a:p>
@@ -1953,7 +1957,7 @@
           <a:p>
             <a:fld id="{DEB065CA-2BF4-44D6-BE19-9CF89952384D}" type="datetimeFigureOut">
               <a:rPr lang="en-US" smtClean="0"/>
-              <a:t>5/15/2022</a:t>
+              <a:t>5/18/2022</a:t>
             </a:fld>
             <a:endParaRPr lang="en-US"/>
           </a:p>
@@ -2066,7 +2070,7 @@
           <a:p>
             <a:fld id="{DEB065CA-2BF4-44D6-BE19-9CF89952384D}" type="datetimeFigureOut">
               <a:rPr lang="en-US" smtClean="0"/>
-              <a:t>5/15/2022</a:t>
+              <a:t>5/18/2022</a:t>
             </a:fld>
             <a:endParaRPr lang="en-US"/>
           </a:p>
@@ -2377,7 +2381,7 @@
           <a:p>
             <a:fld id="{DEB065CA-2BF4-44D6-BE19-9CF89952384D}" type="datetimeFigureOut">
               <a:rPr lang="en-US" smtClean="0"/>
-              <a:t>5/15/2022</a:t>
+              <a:t>5/18/2022</a:t>
             </a:fld>
             <a:endParaRPr lang="en-US"/>
           </a:p>
@@ -2665,7 +2669,7 @@
           <a:p>
             <a:fld id="{DEB065CA-2BF4-44D6-BE19-9CF89952384D}" type="datetimeFigureOut">
               <a:rPr lang="en-US" smtClean="0"/>
-              <a:t>5/15/2022</a:t>
+              <a:t>5/18/2022</a:t>
             </a:fld>
             <a:endParaRPr lang="en-US"/>
           </a:p>
@@ -2906,7 +2910,7 @@
           <a:p>
             <a:fld id="{DEB065CA-2BF4-44D6-BE19-9CF89952384D}" type="datetimeFigureOut">
               <a:rPr lang="en-US" smtClean="0"/>
-              <a:t>5/15/2022</a:t>
+              <a:t>5/18/2022</a:t>
             </a:fld>
             <a:endParaRPr lang="en-US"/>
           </a:p>
@@ -5959,309 +5963,6 @@
 </p:sld>
 </file>
 
-<file path=ppt/slides/slide3.xml><?xml version="1.0" encoding="utf-8"?>
-<p:sld xmlns:a="http://schemas.openxmlformats.org/drawingml/2006/main" xmlns:r="http://schemas.openxmlformats.org/officeDocument/2006/relationships" xmlns:p="http://schemas.openxmlformats.org/presentationml/2006/main">
-  <p:cSld>
-    <p:spTree>
-      <p:nvGrpSpPr>
-        <p:cNvPr id="1" name=""/>
-        <p:cNvGrpSpPr/>
-        <p:nvPr/>
-      </p:nvGrpSpPr>
-      <p:grpSpPr>
-        <a:xfrm>
-          <a:off x="0" y="0"/>
-          <a:ext cx="0" cy="0"/>
-          <a:chOff x="0" y="0"/>
-          <a:chExt cx="0" cy="0"/>
-        </a:xfrm>
-      </p:grpSpPr>
-      <p:pic>
-        <p:nvPicPr>
-          <p:cNvPr id="4" name="Picture 3" descr="Diagram&#10;&#10;Description automatically generated">
-            <a:extLst>
-              <a:ext uri="{FF2B5EF4-FFF2-40B4-BE49-F238E27FC236}">
-                <a16:creationId xmlns:a16="http://schemas.microsoft.com/office/drawing/2014/main" id="{4D081AC3-80EB-4004-9197-3D5E2BFB5CF9}"/>
-              </a:ext>
-            </a:extLst>
-          </p:cNvPr>
-          <p:cNvPicPr>
-            <a:picLocks noChangeAspect="1"/>
-          </p:cNvPicPr>
-          <p:nvPr/>
-        </p:nvPicPr>
-        <p:blipFill>
-          <a:blip r:embed="rId2">
-            <a:extLst>
-              <a:ext uri="{28A0092B-C50C-407E-A947-70E740481C1C}">
-                <a14:useLocalDpi xmlns:a14="http://schemas.microsoft.com/office/drawing/2010/main" val="0"/>
-              </a:ext>
-            </a:extLst>
-          </a:blip>
-          <a:stretch>
-            <a:fillRect/>
-          </a:stretch>
-        </p:blipFill>
-        <p:spPr>
-          <a:xfrm>
-            <a:off x="2081505" y="529289"/>
-            <a:ext cx="6578401" cy="1922293"/>
-          </a:xfrm>
-          <a:prstGeom prst="rect">
-            <a:avLst/>
-          </a:prstGeom>
-        </p:spPr>
-      </p:pic>
-      <p:pic>
-        <p:nvPicPr>
-          <p:cNvPr id="17" name="Picture 16" descr="Diagram&#10;&#10;Description automatically generated">
-            <a:extLst>
-              <a:ext uri="{FF2B5EF4-FFF2-40B4-BE49-F238E27FC236}">
-                <a16:creationId xmlns:a16="http://schemas.microsoft.com/office/drawing/2014/main" id="{A8C15C42-B0D0-4AE7-B27E-FA646996F3A0}"/>
-              </a:ext>
-            </a:extLst>
-          </p:cNvPr>
-          <p:cNvPicPr>
-            <a:picLocks noChangeAspect="1"/>
-          </p:cNvPicPr>
-          <p:nvPr/>
-        </p:nvPicPr>
-        <p:blipFill>
-          <a:blip r:embed="rId2">
-            <a:extLst>
-              <a:ext uri="{28A0092B-C50C-407E-A947-70E740481C1C}">
-                <a14:useLocalDpi xmlns:a14="http://schemas.microsoft.com/office/drawing/2010/main" val="0"/>
-              </a:ext>
-            </a:extLst>
-          </a:blip>
-          <a:stretch>
-            <a:fillRect/>
-          </a:stretch>
-        </p:blipFill>
-        <p:spPr>
-          <a:xfrm>
-            <a:off x="2081505" y="2477022"/>
-            <a:ext cx="6578404" cy="1922293"/>
-          </a:xfrm>
-          <a:prstGeom prst="rect">
-            <a:avLst/>
-          </a:prstGeom>
-        </p:spPr>
-      </p:pic>
-      <p:pic>
-        <p:nvPicPr>
-          <p:cNvPr id="18" name="Picture 17" descr="Diagram&#10;&#10;Description automatically generated">
-            <a:extLst>
-              <a:ext uri="{FF2B5EF4-FFF2-40B4-BE49-F238E27FC236}">
-                <a16:creationId xmlns:a16="http://schemas.microsoft.com/office/drawing/2014/main" id="{AA573E3C-51D5-4BFE-AB50-C6DA51A7F482}"/>
-              </a:ext>
-            </a:extLst>
-          </p:cNvPr>
-          <p:cNvPicPr>
-            <a:picLocks noChangeAspect="1"/>
-          </p:cNvPicPr>
-          <p:nvPr/>
-        </p:nvPicPr>
-        <p:blipFill>
-          <a:blip r:embed="rId2">
-            <a:extLst>
-              <a:ext uri="{28A0092B-C50C-407E-A947-70E740481C1C}">
-                <a14:useLocalDpi xmlns:a14="http://schemas.microsoft.com/office/drawing/2010/main" val="0"/>
-              </a:ext>
-            </a:extLst>
-          </a:blip>
-          <a:stretch>
-            <a:fillRect/>
-          </a:stretch>
-        </p:blipFill>
-        <p:spPr>
-          <a:xfrm>
-            <a:off x="2081502" y="4424755"/>
-            <a:ext cx="6578404" cy="1922293"/>
-          </a:xfrm>
-          <a:prstGeom prst="rect">
-            <a:avLst/>
-          </a:prstGeom>
-        </p:spPr>
-      </p:pic>
-      <p:sp>
-        <p:nvSpPr>
-          <p:cNvPr id="5" name="TextBox 4">
-            <a:extLst>
-              <a:ext uri="{FF2B5EF4-FFF2-40B4-BE49-F238E27FC236}">
-                <a16:creationId xmlns:a16="http://schemas.microsoft.com/office/drawing/2014/main" id="{6971C0FE-EC94-47A5-829B-5FE9E8A8EA24}"/>
-              </a:ext>
-            </a:extLst>
-          </p:cNvPr>
-          <p:cNvSpPr txBox="1"/>
-          <p:nvPr/>
-        </p:nvSpPr>
-        <p:spPr>
-          <a:xfrm>
-            <a:off x="443991" y="1305769"/>
-            <a:ext cx="1547283" cy="369332"/>
-          </a:xfrm>
-          <a:prstGeom prst="rect">
-            <a:avLst/>
-          </a:prstGeom>
-          <a:noFill/>
-        </p:spPr>
-        <p:txBody>
-          <a:bodyPr wrap="none" rtlCol="0">
-            <a:spAutoFit/>
-          </a:bodyPr>
-          <a:lstStyle/>
-          <a:p>
-            <a:r>
-              <a:rPr lang="en-US" dirty="0"/>
-              <a:t>Budget $5,000</a:t>
-            </a:r>
-          </a:p>
-        </p:txBody>
-      </p:sp>
-      <p:sp>
-        <p:nvSpPr>
-          <p:cNvPr id="21" name="TextBox 20">
-            <a:extLst>
-              <a:ext uri="{FF2B5EF4-FFF2-40B4-BE49-F238E27FC236}">
-                <a16:creationId xmlns:a16="http://schemas.microsoft.com/office/drawing/2014/main" id="{CA64EF54-7355-480D-ABB7-36F21CB8BC42}"/>
-              </a:ext>
-            </a:extLst>
-          </p:cNvPr>
-          <p:cNvSpPr txBox="1"/>
-          <p:nvPr/>
-        </p:nvSpPr>
-        <p:spPr>
-          <a:xfrm>
-            <a:off x="385482" y="3253502"/>
-            <a:ext cx="1664302" cy="369332"/>
-          </a:xfrm>
-          <a:prstGeom prst="rect">
-            <a:avLst/>
-          </a:prstGeom>
-          <a:noFill/>
-        </p:spPr>
-        <p:txBody>
-          <a:bodyPr wrap="none" rtlCol="0">
-            <a:spAutoFit/>
-          </a:bodyPr>
-          <a:lstStyle/>
-          <a:p>
-            <a:r>
-              <a:rPr lang="en-US" dirty="0"/>
-              <a:t>Budget $10,000</a:t>
-            </a:r>
-          </a:p>
-        </p:txBody>
-      </p:sp>
-      <p:sp>
-        <p:nvSpPr>
-          <p:cNvPr id="22" name="TextBox 21">
-            <a:extLst>
-              <a:ext uri="{FF2B5EF4-FFF2-40B4-BE49-F238E27FC236}">
-                <a16:creationId xmlns:a16="http://schemas.microsoft.com/office/drawing/2014/main" id="{40BCE874-9A18-4C4E-AB09-37FF6BA74603}"/>
-              </a:ext>
-            </a:extLst>
-          </p:cNvPr>
-          <p:cNvSpPr txBox="1"/>
-          <p:nvPr/>
-        </p:nvSpPr>
-        <p:spPr>
-          <a:xfrm>
-            <a:off x="385481" y="5201235"/>
-            <a:ext cx="1664302" cy="369332"/>
-          </a:xfrm>
-          <a:prstGeom prst="rect">
-            <a:avLst/>
-          </a:prstGeom>
-          <a:noFill/>
-        </p:spPr>
-        <p:txBody>
-          <a:bodyPr wrap="none" rtlCol="0">
-            <a:spAutoFit/>
-          </a:bodyPr>
-          <a:lstStyle/>
-          <a:p>
-            <a:r>
-              <a:rPr lang="en-US" dirty="0"/>
-              <a:t>Budget $15,000</a:t>
-            </a:r>
-          </a:p>
-        </p:txBody>
-      </p:sp>
-      <p:pic>
-        <p:nvPicPr>
-          <p:cNvPr id="10" name="Picture 9">
-            <a:extLst>
-              <a:ext uri="{FF2B5EF4-FFF2-40B4-BE49-F238E27FC236}">
-                <a16:creationId xmlns:a16="http://schemas.microsoft.com/office/drawing/2014/main" id="{B9A180BE-55F8-4150-B485-580DFB39ED75}"/>
-              </a:ext>
-            </a:extLst>
-          </p:cNvPr>
-          <p:cNvPicPr>
-            <a:picLocks noChangeAspect="1"/>
-          </p:cNvPicPr>
-          <p:nvPr/>
-        </p:nvPicPr>
-        <p:blipFill>
-          <a:blip r:embed="rId3"/>
-          <a:stretch>
-            <a:fillRect/>
-          </a:stretch>
-        </p:blipFill>
-        <p:spPr>
-          <a:xfrm>
-            <a:off x="8544815" y="2833595"/>
-            <a:ext cx="466564" cy="419907"/>
-          </a:xfrm>
-          <a:prstGeom prst="rect">
-            <a:avLst/>
-          </a:prstGeom>
-        </p:spPr>
-      </p:pic>
-      <p:pic>
-        <p:nvPicPr>
-          <p:cNvPr id="27" name="Picture 26">
-            <a:extLst>
-              <a:ext uri="{FF2B5EF4-FFF2-40B4-BE49-F238E27FC236}">
-                <a16:creationId xmlns:a16="http://schemas.microsoft.com/office/drawing/2014/main" id="{59EA99A7-45C8-45D7-AA3F-EB46005D87B1}"/>
-              </a:ext>
-            </a:extLst>
-          </p:cNvPr>
-          <p:cNvPicPr>
-            <a:picLocks noChangeAspect="1"/>
-          </p:cNvPicPr>
-          <p:nvPr/>
-        </p:nvPicPr>
-        <p:blipFill>
-          <a:blip r:embed="rId4"/>
-          <a:stretch>
-            <a:fillRect/>
-          </a:stretch>
-        </p:blipFill>
-        <p:spPr>
-          <a:xfrm>
-            <a:off x="9179180" y="3060566"/>
-            <a:ext cx="1046496" cy="755203"/>
-          </a:xfrm>
-          <a:prstGeom prst="rect">
-            <a:avLst/>
-          </a:prstGeom>
-        </p:spPr>
-      </p:pic>
-    </p:spTree>
-    <p:extLst>
-      <p:ext uri="{BB962C8B-B14F-4D97-AF65-F5344CB8AC3E}">
-        <p14:creationId xmlns:p14="http://schemas.microsoft.com/office/powerpoint/2010/main" val="105313806"/>
-      </p:ext>
-    </p:extLst>
-  </p:cSld>
-  <p:clrMapOvr>
-    <a:masterClrMapping/>
-  </p:clrMapOvr>
-</p:sld>
-</file>
-
 <file path=ppt/theme/theme1.xml><?xml version="1.0" encoding="utf-8"?>
 <a:theme xmlns:a="http://schemas.openxmlformats.org/drawingml/2006/main" name="Office Theme">
   <a:themeElements>

</xml_diff>